<commit_message>
Finalized - Mid Evaluation
</commit_message>
<xml_diff>
--- a/outputs/slides/monil_Deep-Learning.pptx
+++ b/outputs/slides/monil_Deep-Learning.pptx
@@ -3128,7 +3128,7 @@
               </a:defRPr>
             </a:pPr>
             <a:r>
-              <a:t>Understanding Deep Learning</a:t>
+              <a:t>Deep Learning Explained</a:t>
             </a:r>
           </a:p>
         </p:txBody>
@@ -3156,7 +3156,7 @@
               </a:defRPr>
             </a:pPr>
             <a:r>
-              <a:t>Deep Learning • Machine Learning • Artificial Intelligence</a:t>
+              <a:t>Artificial Intelligence • Machine Learning • Deep Learning</a:t>
             </a:r>
           </a:p>
         </p:txBody>
@@ -3353,7 +3353,7 @@
               </a:defRPr>
             </a:pPr>
             <a:r>
-              <a:t>3. How Neural Networks Work</a:t>
+              <a:t>3. Working of Neural Networks</a:t>
             </a:r>
           </a:p>
           <a:p>
@@ -3483,7 +3483,7 @@
               </a:defRPr>
             </a:pPr>
             <a:r>
-              <a:t>Deep Learning</a:t>
+              <a:t>Artificial Intelligence</a:t>
             </a:r>
           </a:p>
           <a:p>
@@ -3513,7 +3513,7 @@
               </a:defRPr>
             </a:pPr>
             <a:r>
-              <a:t>Artificial Intelligence</a:t>
+              <a:t>Deep Learning</a:t>
             </a:r>
           </a:p>
           <a:p>
@@ -3543,7 +3543,7 @@
               </a:defRPr>
             </a:pPr>
             <a:r>
-              <a:t>Applications of Deep Learning</a:t>
+              <a:t>Applications</a:t>
             </a:r>
           </a:p>
           <a:p>
@@ -3558,7 +3558,7 @@
               </a:defRPr>
             </a:pPr>
             <a:r>
-              <a:t>Limitations of Deep Learning</a:t>
+              <a:t>Limitations</a:t>
             </a:r>
           </a:p>
           <a:p>
@@ -3573,7 +3573,7 @@
               </a:defRPr>
             </a:pPr>
             <a:r>
-              <a:t>Deep Learning Frameworks</a:t>
+              <a:t>Frameworks</a:t>
             </a:r>
           </a:p>
         </p:txBody>
@@ -3658,7 +3658,7 @@
               </a:defRPr>
             </a:pPr>
             <a:r>
-              <a:t>Deep learning powers features like Google Translate and image grouping.</a:t>
+              <a:t>Deep learning powers features like Google Translate and phone gallery image grouping.</a:t>
             </a:r>
           </a:p>
           <a:p>
@@ -3688,7 +3688,7 @@
               </a:defRPr>
             </a:pPr>
             <a:r>
-              <a:t>AI mimics human behavior, and ML achieves AI through data-trained algorithms.</a:t>
+              <a:t>AI mimics human behavior, ML achieves AI through algorithms, and DL is ML inspired by the human brain.</a:t>
             </a:r>
           </a:p>
           <a:p>
@@ -3703,7 +3703,7 @@
               </a:defRPr>
             </a:pPr>
             <a:r>
-              <a:t>Deep learning is inspired by the human brain's structure, called an artificial neural network.</a:t>
+              <a:t>Deep learning utilizes artificial neural networks.</a:t>
             </a:r>
           </a:p>
         </p:txBody>
@@ -3788,7 +3788,7 @@
               </a:defRPr>
             </a:pPr>
             <a:r>
-              <a:t>Example: Differentiating tomatoes and cherries.</a:t>
+              <a:t>Example: Differentiating between tomatoes and cherries.</a:t>
             </a:r>
           </a:p>
           <a:p>
@@ -3803,7 +3803,7 @@
               </a:defRPr>
             </a:pPr>
             <a:r>
-              <a:t>Machine learning requires humans to define features for differentiation (e.g., size, stem).</a:t>
+              <a:t>Machine learning requires explicit feature definition (e.g., size, stem type).</a:t>
             </a:r>
           </a:p>
           <a:p>
@@ -3833,7 +3833,7 @@
               </a:defRPr>
             </a:pPr>
             <a:r>
-              <a:t>Deep learning requires a significantly higher volume of data for training.</a:t>
+              <a:t>Deep learning demands a much higher volume of data for training.</a:t>
             </a:r>
           </a:p>
         </p:txBody>
@@ -3887,7 +3887,7 @@
               </a:defRPr>
             </a:pPr>
             <a:r>
-              <a:t>How Neural Networks Work</a:t>
+              <a:t>Working of Neural Networks</a:t>
             </a:r>
           </a:p>
         </p:txBody>
@@ -3918,7 +3918,7 @@
               </a:defRPr>
             </a:pPr>
             <a:r>
-              <a:t>Example: Recognizing handwritten digits (e.g., digit nine).</a:t>
+              <a:t>Neural networks can identify handwritten digits, represented as 28x28 pixel images.</a:t>
             </a:r>
           </a:p>
           <a:p>
@@ -3933,7 +3933,7 @@
               </a:defRPr>
             </a:pPr>
             <a:r>
-              <a:t>Images are broken into pixels (e.g., 28x28 pixels = 784 pixels).</a:t>
+              <a:t>Each pixel is fed to a neuron in the input layer.</a:t>
             </a:r>
           </a:p>
           <a:p>
@@ -3948,7 +3948,7 @@
               </a:defRPr>
             </a:pPr>
             <a:r>
-              <a:t>Each pixel feeds into a neuron in the input layer of the neural network.</a:t>
+              <a:t>Information is transferred through weighted channels and hidden layers to the output layer.</a:t>
             </a:r>
           </a:p>
           <a:p>
@@ -3963,7 +3963,7 @@
               </a:defRPr>
             </a:pPr>
             <a:r>
-              <a:t>Information passes through weighted channels between input, hidden, and output layers.</a:t>
+              <a:t>Bias is added to the weighted sum of inputs, then applied to an activation function.</a:t>
             </a:r>
           </a:p>
           <a:p>
@@ -3978,7 +3978,7 @@
               </a:defRPr>
             </a:pPr>
             <a:r>
-              <a:t>Bias is added to the weighted sum of inputs, then applied to an activation function.</a:t>
+              <a:t>Activated neurons pass information, leading to the identification of the input digit.</a:t>
             </a:r>
           </a:p>
           <a:p>
@@ -3993,7 +3993,7 @@
               </a:defRPr>
             </a:pPr>
             <a:r>
-              <a:t>Activated neurons pass information to subsequent layers until the output layer identifies the digit.</a:t>
+              <a:t>Weights and bias are continuously adjusted to train the network.</a:t>
             </a:r>
           </a:p>
         </p:txBody>
@@ -4108,7 +4108,7 @@
               </a:defRPr>
             </a:pPr>
             <a:r>
-              <a:t>Self-driving cars: Companies like Apple, Tesla, and Nissan are developing this technology.</a:t>
+              <a:t>Self-driving cars: A growing reality with companies like Apple, Tesla, and Nissan.</a:t>
             </a:r>
           </a:p>
         </p:txBody>
@@ -4193,7 +4193,7 @@
               </a:defRPr>
             </a:pPr>
             <a:r>
-              <a:t>Requires a massive volume of data for effective training.</a:t>
+              <a:t>Data: Requires a massive volume of data for effective training.</a:t>
             </a:r>
           </a:p>
           <a:p>
@@ -4208,7 +4208,7 @@
               </a:defRPr>
             </a:pPr>
             <a:r>
-              <a:t>Demands significant computational power, often requiring expensive GPUs.</a:t>
+              <a:t>Computational Power: Needs powerful and expensive Graphical Processing Units (GPUs).</a:t>
             </a:r>
           </a:p>
           <a:p>
@@ -4223,7 +4223,7 @@
               </a:defRPr>
             </a:pPr>
             <a:r>
-              <a:t>Training deep neural networks can take hours or even months.</a:t>
+              <a:t>Training Time: Can take hours or even months, increasing with data and network complexity.</a:t>
             </a:r>
           </a:p>
         </p:txBody>
@@ -4323,7 +4323,7 @@
               </a:defRPr>
             </a:pPr>
             <a:r>
-              <a:t>The field of deep learning and AI is still in its early stages.</a:t>
+              <a:t>The field of deep learning and AI is still in its early stages with vast future scope.</a:t>
             </a:r>
           </a:p>
           <a:p>
@@ -4338,7 +4338,7 @@
               </a:defRPr>
             </a:pPr>
             <a:r>
-              <a:t>Innovations like Horex Technology's device for the blind demonstrate future potential.</a:t>
+              <a:t>Innovations like devices for the blind using deep learning and computer vision are emerging.</a:t>
             </a:r>
           </a:p>
           <a:p>
@@ -4353,7 +4353,7 @@
               </a:defRPr>
             </a:pPr>
             <a:r>
-              <a:t>Replicating the human mind may soon move from science fiction to reality.</a:t>
+              <a:t>Replicating the human mind may soon move beyond science fiction.</a:t>
             </a:r>
           </a:p>
         </p:txBody>

</xml_diff>